<commit_message>
Updated Course intro presentation
</commit_message>
<xml_diff>
--- a/AngularJS/0. AngularJS-Course-Introduction.pptx
+++ b/AngularJS/0. AngularJS-Course-Introduction.pptx
@@ -5,26 +5,25 @@
     <p:sldMasterId id="2147483660" r:id="rId2"/>
   </p:sldMasterIdLst>
   <p:notesMasterIdLst>
-    <p:notesMasterId r:id="rId17"/>
+    <p:notesMasterId r:id="rId16"/>
   </p:notesMasterIdLst>
   <p:handoutMasterIdLst>
-    <p:handoutMasterId r:id="rId18"/>
+    <p:handoutMasterId r:id="rId17"/>
   </p:handoutMasterIdLst>
   <p:sldIdLst>
     <p:sldId id="274" r:id="rId3"/>
     <p:sldId id="430" r:id="rId4"/>
-    <p:sldId id="276" r:id="rId5"/>
-    <p:sldId id="353" r:id="rId6"/>
-    <p:sldId id="395" r:id="rId7"/>
-    <p:sldId id="428" r:id="rId8"/>
-    <p:sldId id="429" r:id="rId9"/>
-    <p:sldId id="421" r:id="rId10"/>
-    <p:sldId id="402" r:id="rId11"/>
-    <p:sldId id="403" r:id="rId12"/>
-    <p:sldId id="414" r:id="rId13"/>
-    <p:sldId id="424" r:id="rId14"/>
-    <p:sldId id="419" r:id="rId15"/>
-    <p:sldId id="420" r:id="rId16"/>
+    <p:sldId id="353" r:id="rId5"/>
+    <p:sldId id="395" r:id="rId6"/>
+    <p:sldId id="428" r:id="rId7"/>
+    <p:sldId id="429" r:id="rId8"/>
+    <p:sldId id="421" r:id="rId9"/>
+    <p:sldId id="402" r:id="rId10"/>
+    <p:sldId id="403" r:id="rId11"/>
+    <p:sldId id="414" r:id="rId12"/>
+    <p:sldId id="424" r:id="rId13"/>
+    <p:sldId id="419" r:id="rId14"/>
+    <p:sldId id="420" r:id="rId15"/>
   </p:sldIdLst>
   <p:sldSz cx="12188825" cy="6858000"/>
   <p:notesSz cx="6858000" cy="9144000"/>
@@ -898,23 +897,21 @@
       </p:grpSpPr>
       <p:sp>
         <p:nvSpPr>
-          <p:cNvPr id="445442" name="Rectangle 2"/>
+          <p:cNvPr id="2" name="Slide Image Placeholder 1"/>
           <p:cNvSpPr>
-            <a:spLocks noGrp="1" noRot="1" noChangeAspect="1" noChangeArrowheads="1" noTextEdit="1"/>
+            <a:spLocks noGrp="1" noRot="1" noChangeAspect="1"/>
           </p:cNvSpPr>
           <p:nvPr>
             <p:ph type="sldImg"/>
           </p:nvPr>
         </p:nvSpPr>
-        <p:spPr>
-          <a:ln/>
-        </p:spPr>
-      </p:sp>
-      <p:sp>
-        <p:nvSpPr>
-          <p:cNvPr id="445443" name="Rectangle 3"/>
+        <p:spPr/>
+      </p:sp>
+      <p:sp>
+        <p:nvSpPr>
+          <p:cNvPr id="3" name="Notes Placeholder 2"/>
           <p:cNvSpPr>
-            <a:spLocks noGrp="1" noChangeArrowheads="1"/>
+            <a:spLocks noGrp="1"/>
           </p:cNvSpPr>
           <p:nvPr>
             <p:ph type="body" idx="1"/>
@@ -925,68 +922,18 @@
           <a:bodyPr/>
           <a:lstStyle/>
           <a:p>
-            <a:endParaRPr lang="bg-BG"/>
-          </a:p>
-        </p:txBody>
-      </p:sp>
-      <p:sp>
-        <p:nvSpPr>
-          <p:cNvPr id="2" name="Footer Placeholder 1"/>
+            <a:endParaRPr lang="en-US"/>
+          </a:p>
+        </p:txBody>
+      </p:sp>
+      <p:sp>
+        <p:nvSpPr>
+          <p:cNvPr id="4" name="Slide Number Placeholder 3"/>
           <p:cNvSpPr>
             <a:spLocks noGrp="1"/>
           </p:cNvSpPr>
           <p:nvPr>
-            <p:ph type="ftr" sz="quarter" idx="10"/>
-          </p:nvPr>
-        </p:nvSpPr>
-        <p:spPr/>
-        <p:txBody>
-          <a:bodyPr/>
-          <a:lstStyle/>
-          <a:p>
-            <a:r>
-              <a:rPr lang="en-US" sz="1000" smtClean="0"/>
-              <a:t>© Software University Foundation – </a:t>
-            </a:r>
-            <a:r>
-              <a:rPr lang="en-US" sz="1000" u="sng" smtClean="0">
-                <a:hlinkClick r:id="rId3"/>
-              </a:rPr>
-              <a:t>http://softuni.org</a:t>
-            </a:r>
-            <a:endParaRPr lang="en-US" sz="1000" smtClean="0"/>
-          </a:p>
-          <a:p>
-            <a:r>
-              <a:rPr lang="en-US" sz="1000" smtClean="0"/>
-              <a:t>This work is licensed under the </a:t>
-            </a:r>
-            <a:r>
-              <a:rPr lang="en-US" sz="1000" u="sng" noProof="1" smtClean="0">
-                <a:hlinkClick r:id="rId4"/>
-              </a:rPr>
-              <a:t>Creative Commons Attribution-NonCommercial-ShareAlike</a:t>
-            </a:r>
-            <a:r>
-              <a:rPr lang="en-US" sz="1000" noProof="1" smtClean="0"/>
-              <a:t> </a:t>
-            </a:r>
-            <a:r>
-              <a:rPr lang="en-US" sz="1000" smtClean="0"/>
-              <a:t>license.</a:t>
-            </a:r>
-            <a:endParaRPr lang="en-US" sz="1000" dirty="0"/>
-          </a:p>
-        </p:txBody>
-      </p:sp>
-      <p:sp>
-        <p:nvSpPr>
-          <p:cNvPr id="3" name="Slide Number Placeholder 2"/>
-          <p:cNvSpPr>
-            <a:spLocks noGrp="1"/>
-          </p:cNvSpPr>
-          <p:nvPr>
-            <p:ph type="sldNum" sz="quarter" idx="11"/>
+            <p:ph type="sldNum" sz="quarter" idx="10"/>
           </p:nvPr>
         </p:nvSpPr>
         <p:spPr/>
@@ -1003,10 +950,60 @@
           </a:p>
         </p:txBody>
       </p:sp>
+      <p:sp>
+        <p:nvSpPr>
+          <p:cNvPr id="5" name="Footer Placeholder 4"/>
+          <p:cNvSpPr>
+            <a:spLocks noGrp="1"/>
+          </p:cNvSpPr>
+          <p:nvPr>
+            <p:ph type="ftr" sz="quarter" idx="11"/>
+          </p:nvPr>
+        </p:nvSpPr>
+        <p:spPr/>
+        <p:txBody>
+          <a:bodyPr/>
+          <a:lstStyle/>
+          <a:p>
+            <a:r>
+              <a:rPr lang="en-US" sz="1000" smtClean="0"/>
+              <a:t>© Software University Foundation – </a:t>
+            </a:r>
+            <a:r>
+              <a:rPr lang="en-US" sz="1000" u="sng" smtClean="0">
+                <a:hlinkClick r:id="rId3"/>
+              </a:rPr>
+              <a:t>http://softuni.org</a:t>
+            </a:r>
+            <a:endParaRPr lang="en-US" sz="1000" smtClean="0"/>
+          </a:p>
+          <a:p>
+            <a:r>
+              <a:rPr lang="en-US" sz="1000" smtClean="0"/>
+              <a:t>This work is licensed under the </a:t>
+            </a:r>
+            <a:r>
+              <a:rPr lang="en-US" sz="1000" u="sng" noProof="1" smtClean="0">
+                <a:hlinkClick r:id="rId4"/>
+              </a:rPr>
+              <a:t>Creative Commons Attribution-NonCommercial-ShareAlike</a:t>
+            </a:r>
+            <a:r>
+              <a:rPr lang="en-US" sz="1000" noProof="1" smtClean="0"/>
+              <a:t> </a:t>
+            </a:r>
+            <a:r>
+              <a:rPr lang="en-US" sz="1000" smtClean="0"/>
+              <a:t>license.</a:t>
+            </a:r>
+            <a:endParaRPr lang="en-US" sz="1000" dirty="0"/>
+          </a:p>
+        </p:txBody>
+      </p:sp>
     </p:spTree>
     <p:extLst>
       <p:ext uri="{BB962C8B-B14F-4D97-AF65-F5344CB8AC3E}">
-        <p14:creationId xmlns:p14="http://schemas.microsoft.com/office/powerpoint/2010/main" val="1134749778"/>
+        <p14:creationId xmlns:p14="http://schemas.microsoft.com/office/powerpoint/2010/main" val="3066816831"/>
       </p:ext>
     </p:extLst>
   </p:cSld>
@@ -1066,36 +1063,12 @@
       </p:sp>
       <p:sp>
         <p:nvSpPr>
-          <p:cNvPr id="4" name="Slide Number Placeholder 3"/>
+          <p:cNvPr id="4" name="Footer Placeholder 3"/>
           <p:cNvSpPr>
             <a:spLocks noGrp="1"/>
           </p:cNvSpPr>
           <p:nvPr>
-            <p:ph type="sldNum" sz="quarter" idx="10"/>
-          </p:nvPr>
-        </p:nvSpPr>
-        <p:spPr/>
-        <p:txBody>
-          <a:bodyPr/>
-          <a:lstStyle/>
-          <a:p>
-            <a:fld id="{3EBA5BD7-F043-4D1B-AA17-CD412FC534DE}" type="slidenum">
-              <a:rPr lang="en-US" smtClean="0"/>
-              <a:pPr/>
-              <a:t>4</a:t>
-            </a:fld>
-            <a:endParaRPr lang="en-US" dirty="0"/>
-          </a:p>
-        </p:txBody>
-      </p:sp>
-      <p:sp>
-        <p:nvSpPr>
-          <p:cNvPr id="5" name="Footer Placeholder 4"/>
-          <p:cNvSpPr>
-            <a:spLocks noGrp="1"/>
-          </p:cNvSpPr>
-          <p:nvPr>
-            <p:ph type="ftr" sz="quarter" idx="11"/>
+            <p:ph type="ftr" sz="quarter" idx="10"/>
           </p:nvPr>
         </p:nvSpPr>
         <p:spPr/>
@@ -1138,10 +1111,34 @@
           </a:p>
         </p:txBody>
       </p:sp>
+      <p:sp>
+        <p:nvSpPr>
+          <p:cNvPr id="5" name="Slide Number Placeholder 4"/>
+          <p:cNvSpPr>
+            <a:spLocks noGrp="1"/>
+          </p:cNvSpPr>
+          <p:nvPr>
+            <p:ph type="sldNum" sz="quarter" idx="11"/>
+          </p:nvPr>
+        </p:nvSpPr>
+        <p:spPr/>
+        <p:txBody>
+          <a:bodyPr/>
+          <a:lstStyle/>
+          <a:p>
+            <a:fld id="{3EBA5BD7-F043-4D1B-AA17-CD412FC534DE}" type="slidenum">
+              <a:rPr lang="en-US" smtClean="0"/>
+              <a:pPr/>
+              <a:t>11</a:t>
+            </a:fld>
+            <a:endParaRPr lang="en-US" dirty="0"/>
+          </a:p>
+        </p:txBody>
+      </p:sp>
     </p:spTree>
     <p:extLst>
       <p:ext uri="{BB962C8B-B14F-4D97-AF65-F5344CB8AC3E}">
-        <p14:creationId xmlns:p14="http://schemas.microsoft.com/office/powerpoint/2010/main" val="3066816831"/>
+        <p14:creationId xmlns:p14="http://schemas.microsoft.com/office/powerpoint/2010/main" val="3890612698"/>
       </p:ext>
     </p:extLst>
   </p:cSld>
@@ -1276,7 +1273,7 @@
     </p:spTree>
     <p:extLst>
       <p:ext uri="{BB962C8B-B14F-4D97-AF65-F5344CB8AC3E}">
-        <p14:creationId xmlns:p14="http://schemas.microsoft.com/office/powerpoint/2010/main" val="3890612698"/>
+        <p14:creationId xmlns:p14="http://schemas.microsoft.com/office/powerpoint/2010/main" val="2150994141"/>
       </p:ext>
     </p:extLst>
   </p:cSld>
@@ -1403,141 +1400,6 @@
               <a:rPr lang="en-US" smtClean="0"/>
               <a:pPr/>
               <a:t>13</a:t>
-            </a:fld>
-            <a:endParaRPr lang="en-US" dirty="0"/>
-          </a:p>
-        </p:txBody>
-      </p:sp>
-    </p:spTree>
-    <p:extLst>
-      <p:ext uri="{BB962C8B-B14F-4D97-AF65-F5344CB8AC3E}">
-        <p14:creationId xmlns:p14="http://schemas.microsoft.com/office/powerpoint/2010/main" val="2150994141"/>
-      </p:ext>
-    </p:extLst>
-  </p:cSld>
-  <p:clrMapOvr>
-    <a:masterClrMapping/>
-  </p:clrMapOvr>
-</p:notes>
-</file>
-
-<file path=ppt/notesSlides/notesSlide6.xml><?xml version="1.0" encoding="utf-8"?>
-<p:notes xmlns:a="http://schemas.openxmlformats.org/drawingml/2006/main" xmlns:r="http://schemas.openxmlformats.org/officeDocument/2006/relationships" xmlns:p="http://schemas.openxmlformats.org/presentationml/2006/main">
-  <p:cSld>
-    <p:spTree>
-      <p:nvGrpSpPr>
-        <p:cNvPr id="1" name=""/>
-        <p:cNvGrpSpPr/>
-        <p:nvPr/>
-      </p:nvGrpSpPr>
-      <p:grpSpPr>
-        <a:xfrm>
-          <a:off x="0" y="0"/>
-          <a:ext cx="0" cy="0"/>
-          <a:chOff x="0" y="0"/>
-          <a:chExt cx="0" cy="0"/>
-        </a:xfrm>
-      </p:grpSpPr>
-      <p:sp>
-        <p:nvSpPr>
-          <p:cNvPr id="2" name="Slide Image Placeholder 1"/>
-          <p:cNvSpPr>
-            <a:spLocks noGrp="1" noRot="1" noChangeAspect="1"/>
-          </p:cNvSpPr>
-          <p:nvPr>
-            <p:ph type="sldImg"/>
-          </p:nvPr>
-        </p:nvSpPr>
-        <p:spPr/>
-      </p:sp>
-      <p:sp>
-        <p:nvSpPr>
-          <p:cNvPr id="3" name="Notes Placeholder 2"/>
-          <p:cNvSpPr>
-            <a:spLocks noGrp="1"/>
-          </p:cNvSpPr>
-          <p:nvPr>
-            <p:ph type="body" idx="1"/>
-          </p:nvPr>
-        </p:nvSpPr>
-        <p:spPr/>
-        <p:txBody>
-          <a:bodyPr/>
-          <a:lstStyle/>
-          <a:p>
-            <a:endParaRPr lang="en-US"/>
-          </a:p>
-        </p:txBody>
-      </p:sp>
-      <p:sp>
-        <p:nvSpPr>
-          <p:cNvPr id="4" name="Footer Placeholder 3"/>
-          <p:cNvSpPr>
-            <a:spLocks noGrp="1"/>
-          </p:cNvSpPr>
-          <p:nvPr>
-            <p:ph type="ftr" sz="quarter" idx="10"/>
-          </p:nvPr>
-        </p:nvSpPr>
-        <p:spPr/>
-        <p:txBody>
-          <a:bodyPr/>
-          <a:lstStyle/>
-          <a:p>
-            <a:r>
-              <a:rPr lang="en-US" sz="1000" smtClean="0"/>
-              <a:t>© Software University Foundation – </a:t>
-            </a:r>
-            <a:r>
-              <a:rPr lang="en-US" sz="1000" u="sng" smtClean="0">
-                <a:hlinkClick r:id="rId3"/>
-              </a:rPr>
-              <a:t>http://softuni.org</a:t>
-            </a:r>
-            <a:endParaRPr lang="en-US" sz="1000" smtClean="0"/>
-          </a:p>
-          <a:p>
-            <a:r>
-              <a:rPr lang="en-US" sz="1000" smtClean="0"/>
-              <a:t>This work is licensed under the </a:t>
-            </a:r>
-            <a:r>
-              <a:rPr lang="en-US" sz="1000" u="sng" noProof="1" smtClean="0">
-                <a:hlinkClick r:id="rId4"/>
-              </a:rPr>
-              <a:t>Creative Commons Attribution-NonCommercial-ShareAlike</a:t>
-            </a:r>
-            <a:r>
-              <a:rPr lang="en-US" sz="1000" noProof="1" smtClean="0"/>
-              <a:t> </a:t>
-            </a:r>
-            <a:r>
-              <a:rPr lang="en-US" sz="1000" smtClean="0"/>
-              <a:t>license.</a:t>
-            </a:r>
-            <a:endParaRPr lang="en-US" sz="1000" dirty="0"/>
-          </a:p>
-        </p:txBody>
-      </p:sp>
-      <p:sp>
-        <p:nvSpPr>
-          <p:cNvPr id="5" name="Slide Number Placeholder 4"/>
-          <p:cNvSpPr>
-            <a:spLocks noGrp="1"/>
-          </p:cNvSpPr>
-          <p:nvPr>
-            <p:ph type="sldNum" sz="quarter" idx="11"/>
-          </p:nvPr>
-        </p:nvSpPr>
-        <p:spPr/>
-        <p:txBody>
-          <a:bodyPr/>
-          <a:lstStyle/>
-          <a:p>
-            <a:fld id="{3EBA5BD7-F043-4D1B-AA17-CD412FC534DE}" type="slidenum">
-              <a:rPr lang="en-US" smtClean="0"/>
-              <a:pPr/>
-              <a:t>14</a:t>
             </a:fld>
             <a:endParaRPr lang="en-US" dirty="0"/>
           </a:p>
@@ -4416,322 +4278,6 @@
       </p:grpSpPr>
       <p:sp>
         <p:nvSpPr>
-          <p:cNvPr id="5" name="Slide Number Placeholder 3"/>
-          <p:cNvSpPr>
-            <a:spLocks noGrp="1"/>
-          </p:cNvSpPr>
-          <p:nvPr>
-            <p:ph type="sldNum" sz="quarter" idx="4"/>
-          </p:nvPr>
-        </p:nvSpPr>
-        <p:spPr>
-          <a:prstGeom prst="rect">
-            <a:avLst/>
-          </a:prstGeom>
-        </p:spPr>
-        <p:txBody>
-          <a:bodyPr/>
-          <a:lstStyle/>
-          <a:p>
-            <a:pPr>
-              <a:defRPr/>
-            </a:pPr>
-            <a:fld id="{58452FF4-89E3-4D1B-9927-2DBDC00E58D7}" type="slidenum">
-              <a:rPr lang="en-US" smtClean="0"/>
-              <a:pPr>
-                <a:defRPr/>
-              </a:pPr>
-              <a:t>10</a:t>
-            </a:fld>
-            <a:endParaRPr lang="en-US" dirty="0"/>
-          </a:p>
-        </p:txBody>
-      </p:sp>
-      <p:sp>
-        <p:nvSpPr>
-          <p:cNvPr id="477187" name="Rectangle 3"/>
-          <p:cNvSpPr>
-            <a:spLocks noGrp="1" noChangeArrowheads="1"/>
-          </p:cNvSpPr>
-          <p:nvPr>
-            <p:ph idx="1"/>
-          </p:nvPr>
-        </p:nvSpPr>
-        <p:spPr>
-          <a:xfrm>
-            <a:off x="190413" y="1066800"/>
-            <a:ext cx="11804822" cy="5570355"/>
-          </a:xfrm>
-        </p:spPr>
-        <p:txBody>
-          <a:bodyPr>
-            <a:normAutofit/>
-          </a:bodyPr>
-          <a:lstStyle/>
-          <a:p>
-            <a:pPr>
-              <a:lnSpc>
-                <a:spcPct val="110000"/>
-              </a:lnSpc>
-            </a:pPr>
-            <a:r>
-              <a:rPr lang="en-US" dirty="0"/>
-              <a:t>Lectures: ~ </a:t>
-            </a:r>
-            <a:r>
-              <a:rPr lang="en-US" dirty="0" smtClean="0">
-                <a:latin typeface="Consolas" pitchFamily="49" charset="0"/>
-                <a:cs typeface="Consolas" pitchFamily="49" charset="0"/>
-              </a:rPr>
-              <a:t>14</a:t>
-            </a:r>
-            <a:r>
-              <a:rPr lang="en-US" dirty="0" smtClean="0"/>
-              <a:t> </a:t>
-            </a:r>
-            <a:r>
-              <a:rPr lang="en-US" dirty="0"/>
-              <a:t>hours </a:t>
-            </a:r>
-            <a:r>
-              <a:rPr lang="en-US" dirty="0" smtClean="0"/>
-              <a:t>(7 time * 2 hours)</a:t>
-            </a:r>
-            <a:endParaRPr lang="en-US" dirty="0"/>
-          </a:p>
-          <a:p>
-            <a:pPr>
-              <a:lnSpc>
-                <a:spcPct val="110000"/>
-              </a:lnSpc>
-            </a:pPr>
-            <a:r>
-              <a:rPr lang="en-US" dirty="0"/>
-              <a:t>Practical </a:t>
-            </a:r>
-            <a:r>
-              <a:rPr lang="en-US" dirty="0" smtClean="0"/>
-              <a:t>exercises (in class): </a:t>
-            </a:r>
-            <a:r>
-              <a:rPr lang="en-US" dirty="0"/>
-              <a:t>~ </a:t>
-            </a:r>
-            <a:r>
-              <a:rPr lang="en-US" dirty="0" smtClean="0">
-                <a:latin typeface="Consolas" pitchFamily="49" charset="0"/>
-                <a:cs typeface="Consolas" pitchFamily="49" charset="0"/>
-              </a:rPr>
-              <a:t>14</a:t>
-            </a:r>
-            <a:r>
-              <a:rPr lang="en-US" dirty="0"/>
-              <a:t> hours (7 time * 2 hours</a:t>
-            </a:r>
-            <a:r>
-              <a:rPr lang="en-US" dirty="0" smtClean="0"/>
-              <a:t>)</a:t>
-            </a:r>
-            <a:endParaRPr lang="en-US" dirty="0"/>
-          </a:p>
-          <a:p>
-            <a:pPr>
-              <a:lnSpc>
-                <a:spcPct val="110000"/>
-              </a:lnSpc>
-            </a:pPr>
-            <a:r>
-              <a:rPr lang="en-US" dirty="0" smtClean="0"/>
-              <a:t>Homework</a:t>
-            </a:r>
-            <a:r>
-              <a:rPr lang="en-US" dirty="0"/>
-              <a:t>: </a:t>
-            </a:r>
-            <a:r>
-              <a:rPr lang="en-US" dirty="0" smtClean="0"/>
-              <a:t>~ </a:t>
-            </a:r>
-            <a:r>
-              <a:rPr lang="en-US" dirty="0" smtClean="0">
-                <a:latin typeface="Consolas" pitchFamily="49" charset="0"/>
-                <a:cs typeface="Consolas" pitchFamily="49" charset="0"/>
-              </a:rPr>
-              <a:t>10</a:t>
-            </a:r>
-            <a:r>
-              <a:rPr lang="en-US" dirty="0" smtClean="0"/>
-              <a:t> hours</a:t>
-            </a:r>
-          </a:p>
-          <a:p>
-            <a:pPr>
-              <a:lnSpc>
-                <a:spcPct val="110000"/>
-              </a:lnSpc>
-            </a:pPr>
-            <a:r>
-              <a:rPr lang="en-US" dirty="0" smtClean="0"/>
-              <a:t>Schedule: Jun-Jul 2015</a:t>
-            </a:r>
-          </a:p>
-        </p:txBody>
-      </p:sp>
-      <p:sp>
-        <p:nvSpPr>
-          <p:cNvPr id="477186" name="Rectangle 2"/>
-          <p:cNvSpPr>
-            <a:spLocks noGrp="1" noChangeArrowheads="1"/>
-          </p:cNvSpPr>
-          <p:nvPr>
-            <p:ph type="title"/>
-          </p:nvPr>
-        </p:nvSpPr>
-        <p:spPr/>
-        <p:txBody>
-          <a:bodyPr/>
-          <a:lstStyle/>
-          <a:p>
-            <a:r>
-              <a:rPr lang="en-US" dirty="0" smtClean="0"/>
-              <a:t>Training Duration – AngularJS</a:t>
-            </a:r>
-            <a:endParaRPr lang="en-US" dirty="0"/>
-          </a:p>
-        </p:txBody>
-      </p:sp>
-      <p:pic>
-        <p:nvPicPr>
-          <p:cNvPr id="3074" name="Picture 2"/>
-          <p:cNvPicPr>
-            <a:picLocks noChangeAspect="1" noChangeArrowheads="1"/>
-          </p:cNvPicPr>
-          <p:nvPr/>
-        </p:nvPicPr>
-        <p:blipFill>
-          <a:blip r:embed="rId2">
-            <a:extLst>
-              <a:ext uri="{28A0092B-C50C-407E-A947-70E740481C1C}">
-                <a14:useLocalDpi xmlns:a14="http://schemas.microsoft.com/office/drawing/2010/main" val="0"/>
-              </a:ext>
-            </a:extLst>
-          </a:blip>
-          <a:srcRect/>
-          <a:stretch>
-            <a:fillRect/>
-          </a:stretch>
-        </p:blipFill>
-        <p:spPr bwMode="auto">
-          <a:xfrm>
-            <a:off x="9998513" y="2590799"/>
-            <a:ext cx="1493235" cy="1493237"/>
-          </a:xfrm>
-          <a:prstGeom prst="rect">
-            <a:avLst/>
-          </a:prstGeom>
-          <a:noFill/>
-          <a:extLst>
-            <a:ext uri="{909E8E84-426E-40DD-AFC4-6F175D3DCCD1}">
-              <a14:hiddenFill xmlns:a14="http://schemas.microsoft.com/office/drawing/2010/main">
-                <a:solidFill>
-                  <a:srgbClr val="FFFFFF"/>
-                </a:solidFill>
-              </a14:hiddenFill>
-            </a:ext>
-          </a:extLst>
-        </p:spPr>
-      </p:pic>
-      <p:pic>
-        <p:nvPicPr>
-          <p:cNvPr id="9220" name="Picture 4" descr="https://lh4.googleusercontent.com/-sTkZ_RckgBY/U0EYWUBP-tI/AAAAAAAAERk/Rpo-ITMX9Q4/w1044-h581-no/DSC04812.JPG"/>
-          <p:cNvPicPr>
-            <a:picLocks noChangeAspect="1" noChangeArrowheads="1"/>
-          </p:cNvPicPr>
-          <p:nvPr/>
-        </p:nvPicPr>
-        <p:blipFill>
-          <a:blip r:embed="rId3" cstate="print">
-            <a:extLst>
-              <a:ext uri="{28A0092B-C50C-407E-A947-70E740481C1C}">
-                <a14:useLocalDpi xmlns:a14="http://schemas.microsoft.com/office/drawing/2010/main" val="0"/>
-              </a:ext>
-            </a:extLst>
-          </a:blip>
-          <a:srcRect/>
-          <a:stretch>
-            <a:fillRect/>
-          </a:stretch>
-        </p:blipFill>
-        <p:spPr bwMode="auto">
-          <a:xfrm>
-            <a:off x="8082968" y="4272326"/>
-            <a:ext cx="3697855" cy="2057905"/>
-          </a:xfrm>
-          <a:prstGeom prst="rect">
-            <a:avLst/>
-          </a:prstGeom>
-          <a:noFill/>
-          <a:effectLst>
-            <a:softEdge rad="31750"/>
-          </a:effectLst>
-          <a:extLst>
-            <a:ext uri="{909E8E84-426E-40DD-AFC4-6F175D3DCCD1}">
-              <a14:hiddenFill xmlns:a14="http://schemas.microsoft.com/office/drawing/2010/main">
-                <a:solidFill>
-                  <a:srgbClr val="FFFFFF"/>
-                </a:solidFill>
-              </a14:hiddenFill>
-            </a:ext>
-          </a:extLst>
-        </p:spPr>
-      </p:pic>
-    </p:spTree>
-    <p:extLst>
-      <p:ext uri="{BB962C8B-B14F-4D97-AF65-F5344CB8AC3E}">
-        <p14:creationId xmlns:p14="http://schemas.microsoft.com/office/powerpoint/2010/main" val="3764309347"/>
-      </p:ext>
-    </p:extLst>
-  </p:cSld>
-  <p:clrMapOvr>
-    <a:masterClrMapping/>
-  </p:clrMapOvr>
-  <mc:AlternateContent xmlns:mc="http://schemas.openxmlformats.org/markup-compatibility/2006" xmlns:p14="http://schemas.microsoft.com/office/powerpoint/2010/main">
-    <mc:Choice Requires="p14">
-      <p:transition p14:dur="0"/>
-    </mc:Choice>
-    <mc:Fallback xmlns="">
-      <p:transition/>
-    </mc:Fallback>
-  </mc:AlternateContent>
-  <p:timing>
-    <p:tnLst>
-      <p:par>
-        <p:cTn id="1" dur="indefinite" restart="never" nodeType="tmRoot"/>
-      </p:par>
-    </p:tnLst>
-  </p:timing>
-</p:sld>
-</file>
-
-<file path=ppt/slides/slide11.xml><?xml version="1.0" encoding="utf-8"?>
-<p:sld xmlns:a="http://schemas.openxmlformats.org/drawingml/2006/main" xmlns:r="http://schemas.openxmlformats.org/officeDocument/2006/relationships" xmlns:p="http://schemas.openxmlformats.org/presentationml/2006/main">
-  <p:cSld>
-    <p:spTree>
-      <p:nvGrpSpPr>
-        <p:cNvPr id="1" name=""/>
-        <p:cNvGrpSpPr/>
-        <p:nvPr/>
-      </p:nvGrpSpPr>
-      <p:grpSpPr>
-        <a:xfrm>
-          <a:off x="0" y="0"/>
-          <a:ext cx="0" cy="0"/>
-          <a:chOff x="0" y="0"/>
-          <a:chExt cx="0" cy="0"/>
-        </a:xfrm>
-      </p:grpSpPr>
-      <p:sp>
-        <p:nvSpPr>
           <p:cNvPr id="9" name="Content Placeholder 2"/>
           <p:cNvSpPr txBox="1">
             <a:spLocks/>
@@ -5114,7 +4660,7 @@
               <a:pPr>
                 <a:defRPr/>
               </a:pPr>
-              <a:t>11</a:t>
+              <a:t>10</a:t>
             </a:fld>
             <a:endParaRPr lang="en-US" dirty="0"/>
           </a:p>
@@ -5201,7 +4747,7 @@
 </p:sld>
 </file>
 
-<file path=ppt/slides/slide12.xml><?xml version="1.0" encoding="utf-8"?>
+<file path=ppt/slides/slide11.xml><?xml version="1.0" encoding="utf-8"?>
 <p:sld xmlns:a="http://schemas.openxmlformats.org/drawingml/2006/main" xmlns:r="http://schemas.openxmlformats.org/officeDocument/2006/relationships" xmlns:p="http://schemas.openxmlformats.org/presentationml/2006/main">
   <p:cSld>
     <p:spTree>
@@ -5306,7 +4852,7 @@
 </p:sld>
 </file>
 
-<file path=ppt/slides/slide13.xml><?xml version="1.0" encoding="utf-8"?>
+<file path=ppt/slides/slide12.xml><?xml version="1.0" encoding="utf-8"?>
 <p:sld xmlns:a="http://schemas.openxmlformats.org/drawingml/2006/main" xmlns:r="http://schemas.openxmlformats.org/officeDocument/2006/relationships" xmlns:p="http://schemas.openxmlformats.org/presentationml/2006/main">
   <p:cSld>
     <p:spTree>
@@ -5456,7 +5002,7 @@
             <a:fld id="{C014DD1E-5D91-48A3-AD6D-45FBA980D106}" type="slidenum">
               <a:rPr lang="en-US" smtClean="0"/>
               <a:pPr/>
-              <a:t>13</a:t>
+              <a:t>12</a:t>
             </a:fld>
             <a:endParaRPr lang="en-US" dirty="0"/>
           </a:p>
@@ -5615,7 +5161,7 @@
 </p:sld>
 </file>
 
-<file path=ppt/slides/slide14.xml><?xml version="1.0" encoding="utf-8"?>
+<file path=ppt/slides/slide13.xml><?xml version="1.0" encoding="utf-8"?>
 <p:sld xmlns:a="http://schemas.openxmlformats.org/drawingml/2006/main" xmlns:r="http://schemas.openxmlformats.org/officeDocument/2006/relationships" xmlns:p="http://schemas.openxmlformats.org/presentationml/2006/main">
   <p:cSld>
     <p:spTree>
@@ -6383,278 +5929,6 @@
       </p:grpSpPr>
       <p:sp>
         <p:nvSpPr>
-          <p:cNvPr id="444418" name="Rectangle 2"/>
-          <p:cNvSpPr>
-            <a:spLocks noGrp="1" noChangeArrowheads="1"/>
-          </p:cNvSpPr>
-          <p:nvPr>
-            <p:ph type="title"/>
-          </p:nvPr>
-        </p:nvSpPr>
-        <p:spPr/>
-        <p:txBody>
-          <a:bodyPr>
-            <a:normAutofit/>
-          </a:bodyPr>
-          <a:lstStyle/>
-          <a:p>
-            <a:r>
-              <a:rPr lang="en-US" dirty="0" smtClean="0"/>
-              <a:t>Table of Contents</a:t>
-            </a:r>
-            <a:endParaRPr lang="bg-BG" dirty="0"/>
-          </a:p>
-        </p:txBody>
-      </p:sp>
-      <p:sp>
-        <p:nvSpPr>
-          <p:cNvPr id="444419" name="Rectangle 3"/>
-          <p:cNvSpPr>
-            <a:spLocks noGrp="1" noChangeArrowheads="1"/>
-          </p:cNvSpPr>
-          <p:nvPr>
-            <p:ph idx="4294967295"/>
-          </p:nvPr>
-        </p:nvSpPr>
-        <p:spPr>
-          <a:xfrm>
-            <a:off x="190413" y="1191467"/>
-            <a:ext cx="11804822" cy="5530010"/>
-          </a:xfrm>
-        </p:spPr>
-        <p:txBody>
-          <a:bodyPr>
-            <a:normAutofit/>
-          </a:bodyPr>
-          <a:lstStyle/>
-          <a:p>
-            <a:pPr marL="446088" indent="-446088">
-              <a:lnSpc>
-                <a:spcPts val="4000"/>
-              </a:lnSpc>
-              <a:buFontTx/>
-              <a:buAutoNum type="arabicPeriod"/>
-            </a:pPr>
-            <a:r>
-              <a:rPr lang="en-US" dirty="0" smtClean="0"/>
-              <a:t>Course Objectives</a:t>
-            </a:r>
-            <a:endParaRPr lang="bg-BG" dirty="0" smtClean="0"/>
-          </a:p>
-          <a:p>
-            <a:pPr marL="446088" indent="-446088">
-              <a:lnSpc>
-                <a:spcPts val="4000"/>
-              </a:lnSpc>
-              <a:buFontTx/>
-              <a:buAutoNum type="arabicPeriod"/>
-            </a:pPr>
-            <a:r>
-              <a:rPr lang="en-US" dirty="0" smtClean="0"/>
-              <a:t>Course Program</a:t>
-            </a:r>
-            <a:endParaRPr lang="bg-BG" dirty="0" smtClean="0"/>
-          </a:p>
-          <a:p>
-            <a:pPr marL="446088" indent="-446088">
-              <a:lnSpc>
-                <a:spcPts val="4000"/>
-              </a:lnSpc>
-              <a:buFontTx/>
-              <a:buAutoNum type="arabicPeriod"/>
-            </a:pPr>
-            <a:r>
-              <a:rPr lang="en-US" dirty="0" smtClean="0"/>
-              <a:t>Trainers Team</a:t>
-            </a:r>
-          </a:p>
-          <a:p>
-            <a:pPr marL="446088" indent="-446088">
-              <a:lnSpc>
-                <a:spcPts val="4000"/>
-              </a:lnSpc>
-              <a:buFontTx/>
-              <a:buAutoNum type="arabicPeriod"/>
-            </a:pPr>
-            <a:r>
-              <a:rPr lang="en-US" dirty="0" smtClean="0"/>
-              <a:t>Examination</a:t>
-            </a:r>
-          </a:p>
-          <a:p>
-            <a:pPr marL="446088" indent="-446088">
-              <a:lnSpc>
-                <a:spcPts val="4000"/>
-              </a:lnSpc>
-              <a:buFontTx/>
-              <a:buAutoNum type="arabicPeriod"/>
-            </a:pPr>
-            <a:r>
-              <a:rPr lang="en-US" dirty="0" smtClean="0"/>
-              <a:t>Learning Resources</a:t>
-            </a:r>
-            <a:endParaRPr lang="en-US" dirty="0"/>
-          </a:p>
-        </p:txBody>
-      </p:sp>
-      <p:sp>
-        <p:nvSpPr>
-          <p:cNvPr id="2" name="Slide Number Placeholder 1"/>
-          <p:cNvSpPr>
-            <a:spLocks noGrp="1"/>
-          </p:cNvSpPr>
-          <p:nvPr>
-            <p:ph type="sldNum" sz="quarter" idx="4"/>
-          </p:nvPr>
-        </p:nvSpPr>
-        <p:spPr>
-          <a:xfrm>
-            <a:off x="11566412" y="6525002"/>
-            <a:ext cx="428822" cy="196477"/>
-          </a:xfrm>
-        </p:spPr>
-        <p:txBody>
-          <a:bodyPr/>
-          <a:lstStyle/>
-          <a:p>
-            <a:fld id="{C014DD1E-5D91-48A3-AD6D-45FBA980D106}" type="slidenum">
-              <a:rPr lang="en-US" smtClean="0"/>
-              <a:pPr/>
-              <a:t>3</a:t>
-            </a:fld>
-            <a:endParaRPr lang="en-US" dirty="0"/>
-          </a:p>
-        </p:txBody>
-      </p:sp>
-      <p:pic>
-        <p:nvPicPr>
-          <p:cNvPr id="10" name="Picture 2" descr="http://www.graphicsfuel.com/wp-content/uploads/2012/07/books-icon-512.png"/>
-          <p:cNvPicPr>
-            <a:picLocks noChangeAspect="1" noChangeArrowheads="1"/>
-          </p:cNvPicPr>
-          <p:nvPr/>
-        </p:nvPicPr>
-        <p:blipFill>
-          <a:blip r:embed="rId3" cstate="print">
-            <a:extLst>
-              <a:ext uri="{28A0092B-C50C-407E-A947-70E740481C1C}">
-                <a14:useLocalDpi xmlns:a14="http://schemas.microsoft.com/office/drawing/2010/main" val="0"/>
-              </a:ext>
-            </a:extLst>
-          </a:blip>
-          <a:srcRect/>
-          <a:stretch>
-            <a:fillRect/>
-          </a:stretch>
-        </p:blipFill>
-        <p:spPr bwMode="auto">
-          <a:xfrm>
-            <a:off x="5637212" y="1447800"/>
-            <a:ext cx="2679495" cy="2679495"/>
-          </a:xfrm>
-          <a:prstGeom prst="rect">
-            <a:avLst/>
-          </a:prstGeom>
-          <a:noFill/>
-          <a:extLst>
-            <a:ext uri="{909E8E84-426E-40DD-AFC4-6F175D3DCCD1}">
-              <a14:hiddenFill xmlns:a14="http://schemas.microsoft.com/office/drawing/2010/main">
-                <a:solidFill>
-                  <a:srgbClr val="FFFFFF"/>
-                </a:solidFill>
-              </a14:hiddenFill>
-            </a:ext>
-          </a:extLst>
-        </p:spPr>
-      </p:pic>
-      <p:pic>
-        <p:nvPicPr>
-          <p:cNvPr id="1026" name="Picture 2" descr="http://www.protrendy.com/wp-content/uploads/2014/04/js_logo.png"/>
-          <p:cNvPicPr>
-            <a:picLocks noChangeAspect="1" noChangeArrowheads="1"/>
-          </p:cNvPicPr>
-          <p:nvPr/>
-        </p:nvPicPr>
-        <p:blipFill>
-          <a:blip r:embed="rId4" cstate="print">
-            <a:extLst>
-              <a:ext uri="{28A0092B-C50C-407E-A947-70E740481C1C}">
-                <a14:useLocalDpi xmlns:a14="http://schemas.microsoft.com/office/drawing/2010/main" val="0"/>
-              </a:ext>
-            </a:extLst>
-          </a:blip>
-          <a:srcRect/>
-          <a:stretch>
-            <a:fillRect/>
-          </a:stretch>
-        </p:blipFill>
-        <p:spPr bwMode="auto">
-          <a:xfrm>
-            <a:off x="9060284" y="3956472"/>
-            <a:ext cx="2225254" cy="2225254"/>
-          </a:xfrm>
-          <a:prstGeom prst="rect">
-            <a:avLst/>
-          </a:prstGeom>
-          <a:noFill/>
-          <a:extLst>
-            <a:ext uri="{909E8E84-426E-40DD-AFC4-6F175D3DCCD1}">
-              <a14:hiddenFill xmlns:a14="http://schemas.microsoft.com/office/drawing/2010/main">
-                <a:solidFill>
-                  <a:srgbClr val="FFFFFF"/>
-                </a:solidFill>
-              </a14:hiddenFill>
-            </a:ext>
-          </a:extLst>
-        </p:spPr>
-      </p:pic>
-    </p:spTree>
-    <p:extLst>
-      <p:ext uri="{BB962C8B-B14F-4D97-AF65-F5344CB8AC3E}">
-        <p14:creationId xmlns:p14="http://schemas.microsoft.com/office/powerpoint/2010/main" val="1646986932"/>
-      </p:ext>
-    </p:extLst>
-  </p:cSld>
-  <p:clrMapOvr>
-    <a:masterClrMapping/>
-  </p:clrMapOvr>
-  <mc:AlternateContent xmlns:mc="http://schemas.openxmlformats.org/markup-compatibility/2006" xmlns:p14="http://schemas.microsoft.com/office/powerpoint/2010/main">
-    <mc:Choice Requires="p14">
-      <p:transition p14:dur="0"/>
-    </mc:Choice>
-    <mc:Fallback xmlns="">
-      <p:transition/>
-    </mc:Fallback>
-  </mc:AlternateContent>
-  <p:timing>
-    <p:tnLst>
-      <p:par>
-        <p:cTn id="1" dur="indefinite" restart="never" nodeType="tmRoot"/>
-      </p:par>
-    </p:tnLst>
-  </p:timing>
-</p:sld>
-</file>
-
-<file path=ppt/slides/slide4.xml><?xml version="1.0" encoding="utf-8"?>
-<p:sld xmlns:a="http://schemas.openxmlformats.org/drawingml/2006/main" xmlns:r="http://schemas.openxmlformats.org/officeDocument/2006/relationships" xmlns:p="http://schemas.openxmlformats.org/presentationml/2006/main">
-  <p:cSld>
-    <p:spTree>
-      <p:nvGrpSpPr>
-        <p:cNvPr id="1" name=""/>
-        <p:cNvGrpSpPr/>
-        <p:nvPr/>
-      </p:nvGrpSpPr>
-      <p:grpSpPr>
-        <a:xfrm>
-          <a:off x="0" y="0"/>
-          <a:ext cx="0" cy="0"/>
-          <a:chOff x="0" y="0"/>
-          <a:chExt cx="0" cy="0"/>
-        </a:xfrm>
-      </p:grpSpPr>
-      <p:sp>
-        <p:nvSpPr>
           <p:cNvPr id="2" name="Title 1"/>
           <p:cNvSpPr>
             <a:spLocks noGrp="1"/>
@@ -6783,7 +6057,7 @@
 </p:sld>
 </file>
 
-<file path=ppt/slides/slide5.xml><?xml version="1.0" encoding="utf-8"?>
+<file path=ppt/slides/slide4.xml><?xml version="1.0" encoding="utf-8"?>
 <p:sld xmlns:a="http://schemas.openxmlformats.org/drawingml/2006/main" xmlns:r="http://schemas.openxmlformats.org/officeDocument/2006/relationships" xmlns:p="http://schemas.openxmlformats.org/presentationml/2006/main">
   <p:cSld>
     <p:spTree>
@@ -6818,7 +6092,7 @@
             <a:fld id="{58452FF4-89E3-4D1B-9927-2DBDC00E58D7}" type="slidenum">
               <a:rPr lang="en-US" smtClean="0"/>
               <a:pPr/>
-              <a:t>5</a:t>
+              <a:t>4</a:t>
             </a:fld>
             <a:endParaRPr lang="en-US" dirty="0"/>
           </a:p>
@@ -7116,7 +6390,7 @@
 </p:sld>
 </file>
 
-<file path=ppt/slides/slide6.xml><?xml version="1.0" encoding="utf-8"?>
+<file path=ppt/slides/slide5.xml><?xml version="1.0" encoding="utf-8"?>
 <p:sld xmlns:a="http://schemas.openxmlformats.org/drawingml/2006/main" xmlns:r="http://schemas.openxmlformats.org/officeDocument/2006/relationships" xmlns:p="http://schemas.openxmlformats.org/presentationml/2006/main">
   <p:cSld>
     <p:spTree>
@@ -7151,7 +6425,7 @@
             <a:fld id="{58452FF4-89E3-4D1B-9927-2DBDC00E58D7}" type="slidenum">
               <a:rPr lang="en-US" smtClean="0"/>
               <a:pPr/>
-              <a:t>6</a:t>
+              <a:t>5</a:t>
             </a:fld>
             <a:endParaRPr lang="en-US" dirty="0"/>
           </a:p>
@@ -7507,7 +6781,7 @@
 </p:sld>
 </file>
 
-<file path=ppt/slides/slide7.xml><?xml version="1.0" encoding="utf-8"?>
+<file path=ppt/slides/slide6.xml><?xml version="1.0" encoding="utf-8"?>
 <p:sld xmlns:a="http://schemas.openxmlformats.org/drawingml/2006/main" xmlns:r="http://schemas.openxmlformats.org/officeDocument/2006/relationships" xmlns:p="http://schemas.openxmlformats.org/presentationml/2006/main">
   <p:cSld>
     <p:spTree>
@@ -7542,7 +6816,7 @@
             <a:fld id="{58452FF4-89E3-4D1B-9927-2DBDC00E58D7}" type="slidenum">
               <a:rPr lang="en-US" smtClean="0"/>
               <a:pPr/>
-              <a:t>7</a:t>
+              <a:t>6</a:t>
             </a:fld>
             <a:endParaRPr lang="en-US" dirty="0"/>
           </a:p>
@@ -7885,7 +7159,7 @@
 </p:sld>
 </file>
 
-<file path=ppt/slides/slide8.xml><?xml version="1.0" encoding="utf-8"?>
+<file path=ppt/slides/slide7.xml><?xml version="1.0" encoding="utf-8"?>
 <p:sld xmlns:a="http://schemas.openxmlformats.org/drawingml/2006/main" xmlns:r="http://schemas.openxmlformats.org/officeDocument/2006/relationships" xmlns:p="http://schemas.openxmlformats.org/presentationml/2006/main">
   <p:cSld>
     <p:spTree>
@@ -7920,7 +7194,7 @@
             <a:fld id="{C014DD1E-5D91-48A3-AD6D-45FBA980D106}" type="slidenum">
               <a:rPr lang="en-US" smtClean="0"/>
               <a:pPr/>
-              <a:t>8</a:t>
+              <a:t>7</a:t>
             </a:fld>
             <a:endParaRPr lang="en-US" dirty="0"/>
           </a:p>
@@ -8255,7 +7529,7 @@
 </p:sld>
 </file>
 
-<file path=ppt/slides/slide9.xml><?xml version="1.0" encoding="utf-8"?>
+<file path=ppt/slides/slide8.xml><?xml version="1.0" encoding="utf-8"?>
 <p:sld xmlns:a="http://schemas.openxmlformats.org/drawingml/2006/main" xmlns:r="http://schemas.openxmlformats.org/officeDocument/2006/relationships" xmlns:p="http://schemas.openxmlformats.org/presentationml/2006/main">
   <p:cSld>
     <p:spTree>
@@ -8378,6 +7652,322 @@
     <p:extLst>
       <p:ext uri="{BB962C8B-B14F-4D97-AF65-F5344CB8AC3E}">
         <p14:creationId xmlns:p14="http://schemas.microsoft.com/office/powerpoint/2010/main" val="2780754790"/>
+      </p:ext>
+    </p:extLst>
+  </p:cSld>
+  <p:clrMapOvr>
+    <a:masterClrMapping/>
+  </p:clrMapOvr>
+  <mc:AlternateContent xmlns:mc="http://schemas.openxmlformats.org/markup-compatibility/2006" xmlns:p14="http://schemas.microsoft.com/office/powerpoint/2010/main">
+    <mc:Choice Requires="p14">
+      <p:transition p14:dur="0"/>
+    </mc:Choice>
+    <mc:Fallback xmlns="">
+      <p:transition/>
+    </mc:Fallback>
+  </mc:AlternateContent>
+  <p:timing>
+    <p:tnLst>
+      <p:par>
+        <p:cTn id="1" dur="indefinite" restart="never" nodeType="tmRoot"/>
+      </p:par>
+    </p:tnLst>
+  </p:timing>
+</p:sld>
+</file>
+
+<file path=ppt/slides/slide9.xml><?xml version="1.0" encoding="utf-8"?>
+<p:sld xmlns:a="http://schemas.openxmlformats.org/drawingml/2006/main" xmlns:r="http://schemas.openxmlformats.org/officeDocument/2006/relationships" xmlns:p="http://schemas.openxmlformats.org/presentationml/2006/main">
+  <p:cSld>
+    <p:spTree>
+      <p:nvGrpSpPr>
+        <p:cNvPr id="1" name=""/>
+        <p:cNvGrpSpPr/>
+        <p:nvPr/>
+      </p:nvGrpSpPr>
+      <p:grpSpPr>
+        <a:xfrm>
+          <a:off x="0" y="0"/>
+          <a:ext cx="0" cy="0"/>
+          <a:chOff x="0" y="0"/>
+          <a:chExt cx="0" cy="0"/>
+        </a:xfrm>
+      </p:grpSpPr>
+      <p:sp>
+        <p:nvSpPr>
+          <p:cNvPr id="5" name="Slide Number Placeholder 3"/>
+          <p:cNvSpPr>
+            <a:spLocks noGrp="1"/>
+          </p:cNvSpPr>
+          <p:nvPr>
+            <p:ph type="sldNum" sz="quarter" idx="4"/>
+          </p:nvPr>
+        </p:nvSpPr>
+        <p:spPr>
+          <a:prstGeom prst="rect">
+            <a:avLst/>
+          </a:prstGeom>
+        </p:spPr>
+        <p:txBody>
+          <a:bodyPr/>
+          <a:lstStyle/>
+          <a:p>
+            <a:pPr>
+              <a:defRPr/>
+            </a:pPr>
+            <a:fld id="{58452FF4-89E3-4D1B-9927-2DBDC00E58D7}" type="slidenum">
+              <a:rPr lang="en-US" smtClean="0"/>
+              <a:pPr>
+                <a:defRPr/>
+              </a:pPr>
+              <a:t>9</a:t>
+            </a:fld>
+            <a:endParaRPr lang="en-US" dirty="0"/>
+          </a:p>
+        </p:txBody>
+      </p:sp>
+      <p:sp>
+        <p:nvSpPr>
+          <p:cNvPr id="477187" name="Rectangle 3"/>
+          <p:cNvSpPr>
+            <a:spLocks noGrp="1" noChangeArrowheads="1"/>
+          </p:cNvSpPr>
+          <p:nvPr>
+            <p:ph idx="1"/>
+          </p:nvPr>
+        </p:nvSpPr>
+        <p:spPr>
+          <a:xfrm>
+            <a:off x="190413" y="1066800"/>
+            <a:ext cx="11804822" cy="5570355"/>
+          </a:xfrm>
+        </p:spPr>
+        <p:txBody>
+          <a:bodyPr>
+            <a:normAutofit/>
+          </a:bodyPr>
+          <a:lstStyle/>
+          <a:p>
+            <a:pPr>
+              <a:lnSpc>
+                <a:spcPct val="110000"/>
+              </a:lnSpc>
+            </a:pPr>
+            <a:r>
+              <a:rPr lang="en-US" dirty="0"/>
+              <a:t>Lectures: ~ </a:t>
+            </a:r>
+            <a:r>
+              <a:rPr lang="en-US" dirty="0" smtClean="0">
+                <a:latin typeface="Consolas" pitchFamily="49" charset="0"/>
+                <a:cs typeface="Consolas" pitchFamily="49" charset="0"/>
+              </a:rPr>
+              <a:t>14</a:t>
+            </a:r>
+            <a:r>
+              <a:rPr lang="en-US" dirty="0" smtClean="0"/>
+              <a:t> </a:t>
+            </a:r>
+            <a:r>
+              <a:rPr lang="en-US" dirty="0"/>
+              <a:t>hours </a:t>
+            </a:r>
+            <a:r>
+              <a:rPr lang="en-US" dirty="0" smtClean="0"/>
+              <a:t>(7 time * 2 hours)</a:t>
+            </a:r>
+            <a:endParaRPr lang="en-US" dirty="0"/>
+          </a:p>
+          <a:p>
+            <a:pPr>
+              <a:lnSpc>
+                <a:spcPct val="110000"/>
+              </a:lnSpc>
+            </a:pPr>
+            <a:r>
+              <a:rPr lang="en-US" dirty="0"/>
+              <a:t>Practical </a:t>
+            </a:r>
+            <a:r>
+              <a:rPr lang="en-US" dirty="0" smtClean="0"/>
+              <a:t>exercises (in class): </a:t>
+            </a:r>
+            <a:r>
+              <a:rPr lang="en-US" dirty="0"/>
+              <a:t>~ </a:t>
+            </a:r>
+            <a:r>
+              <a:rPr lang="en-US" dirty="0" smtClean="0">
+                <a:latin typeface="Consolas" pitchFamily="49" charset="0"/>
+                <a:cs typeface="Consolas" pitchFamily="49" charset="0"/>
+              </a:rPr>
+              <a:t>14</a:t>
+            </a:r>
+            <a:r>
+              <a:rPr lang="en-US" dirty="0"/>
+              <a:t> hours (7 time * 2 hours</a:t>
+            </a:r>
+            <a:r>
+              <a:rPr lang="en-US" dirty="0" smtClean="0"/>
+              <a:t>)</a:t>
+            </a:r>
+            <a:endParaRPr lang="en-US" dirty="0"/>
+          </a:p>
+          <a:p>
+            <a:pPr>
+              <a:lnSpc>
+                <a:spcPct val="110000"/>
+              </a:lnSpc>
+            </a:pPr>
+            <a:r>
+              <a:rPr lang="en-US" dirty="0" smtClean="0"/>
+              <a:t>Homework</a:t>
+            </a:r>
+            <a:r>
+              <a:rPr lang="en-US" dirty="0"/>
+              <a:t>: </a:t>
+            </a:r>
+            <a:r>
+              <a:rPr lang="en-US" dirty="0" smtClean="0"/>
+              <a:t>~ </a:t>
+            </a:r>
+            <a:r>
+              <a:rPr lang="en-US" dirty="0" smtClean="0">
+                <a:latin typeface="Consolas" pitchFamily="49" charset="0"/>
+                <a:cs typeface="Consolas" pitchFamily="49" charset="0"/>
+              </a:rPr>
+              <a:t>10</a:t>
+            </a:r>
+            <a:r>
+              <a:rPr lang="en-US" dirty="0" smtClean="0"/>
+              <a:t> hours</a:t>
+            </a:r>
+          </a:p>
+          <a:p>
+            <a:pPr>
+              <a:lnSpc>
+                <a:spcPct val="110000"/>
+              </a:lnSpc>
+            </a:pPr>
+            <a:r>
+              <a:rPr lang="en-US" dirty="0" smtClean="0"/>
+              <a:t>Schedule: Jun-Jul 2015</a:t>
+            </a:r>
+          </a:p>
+        </p:txBody>
+      </p:sp>
+      <p:sp>
+        <p:nvSpPr>
+          <p:cNvPr id="477186" name="Rectangle 2"/>
+          <p:cNvSpPr>
+            <a:spLocks noGrp="1" noChangeArrowheads="1"/>
+          </p:cNvSpPr>
+          <p:nvPr>
+            <p:ph type="title"/>
+          </p:nvPr>
+        </p:nvSpPr>
+        <p:spPr/>
+        <p:txBody>
+          <a:bodyPr/>
+          <a:lstStyle/>
+          <a:p>
+            <a:r>
+              <a:rPr lang="en-US" dirty="0" smtClean="0"/>
+              <a:t>Training Duration – AngularJS</a:t>
+            </a:r>
+            <a:endParaRPr lang="en-US" dirty="0"/>
+          </a:p>
+        </p:txBody>
+      </p:sp>
+      <p:pic>
+        <p:nvPicPr>
+          <p:cNvPr id="3074" name="Picture 2"/>
+          <p:cNvPicPr>
+            <a:picLocks noChangeAspect="1" noChangeArrowheads="1"/>
+          </p:cNvPicPr>
+          <p:nvPr/>
+        </p:nvPicPr>
+        <p:blipFill>
+          <a:blip r:embed="rId2">
+            <a:extLst>
+              <a:ext uri="{28A0092B-C50C-407E-A947-70E740481C1C}">
+                <a14:useLocalDpi xmlns:a14="http://schemas.microsoft.com/office/drawing/2010/main" val="0"/>
+              </a:ext>
+            </a:extLst>
+          </a:blip>
+          <a:srcRect/>
+          <a:stretch>
+            <a:fillRect/>
+          </a:stretch>
+        </p:blipFill>
+        <p:spPr bwMode="auto">
+          <a:xfrm>
+            <a:off x="9998513" y="2590799"/>
+            <a:ext cx="1493235" cy="1493237"/>
+          </a:xfrm>
+          <a:prstGeom prst="rect">
+            <a:avLst/>
+          </a:prstGeom>
+          <a:noFill/>
+          <a:extLst>
+            <a:ext uri="{909E8E84-426E-40DD-AFC4-6F175D3DCCD1}">
+              <a14:hiddenFill xmlns:a14="http://schemas.microsoft.com/office/drawing/2010/main">
+                <a:solidFill>
+                  <a:srgbClr val="FFFFFF"/>
+                </a:solidFill>
+              </a14:hiddenFill>
+            </a:ext>
+          </a:extLst>
+        </p:spPr>
+      </p:pic>
+      <p:pic>
+        <p:nvPicPr>
+          <p:cNvPr id="9220" name="Picture 4" descr="https://lh4.googleusercontent.com/-sTkZ_RckgBY/U0EYWUBP-tI/AAAAAAAAERk/Rpo-ITMX9Q4/w1044-h581-no/DSC04812.JPG"/>
+          <p:cNvPicPr>
+            <a:picLocks noChangeAspect="1" noChangeArrowheads="1"/>
+          </p:cNvPicPr>
+          <p:nvPr/>
+        </p:nvPicPr>
+        <p:blipFill>
+          <a:blip r:embed="rId3" cstate="print">
+            <a:extLst>
+              <a:ext uri="{28A0092B-C50C-407E-A947-70E740481C1C}">
+                <a14:useLocalDpi xmlns:a14="http://schemas.microsoft.com/office/drawing/2010/main" val="0"/>
+              </a:ext>
+            </a:extLst>
+          </a:blip>
+          <a:srcRect/>
+          <a:stretch>
+            <a:fillRect/>
+          </a:stretch>
+        </p:blipFill>
+        <p:spPr bwMode="auto">
+          <a:xfrm>
+            <a:off x="8082968" y="4272326"/>
+            <a:ext cx="3697855" cy="2057905"/>
+          </a:xfrm>
+          <a:prstGeom prst="rect">
+            <a:avLst/>
+          </a:prstGeom>
+          <a:noFill/>
+          <a:effectLst>
+            <a:softEdge rad="31750"/>
+          </a:effectLst>
+          <a:extLst>
+            <a:ext uri="{909E8E84-426E-40DD-AFC4-6F175D3DCCD1}">
+              <a14:hiddenFill xmlns:a14="http://schemas.microsoft.com/office/drawing/2010/main">
+                <a:solidFill>
+                  <a:srgbClr val="FFFFFF"/>
+                </a:solidFill>
+              </a14:hiddenFill>
+            </a:ext>
+          </a:extLst>
+        </p:spPr>
+      </p:pic>
+    </p:spTree>
+    <p:extLst>
+      <p:ext uri="{BB962C8B-B14F-4D97-AF65-F5344CB8AC3E}">
+        <p14:creationId xmlns:p14="http://schemas.microsoft.com/office/powerpoint/2010/main" val="3764309347"/>
       </p:ext>
     </p:extLst>
   </p:cSld>

</xml_diff>